<commit_message>
Update Quantum-enhanced Markov chain Monte Carlo.pptx
</commit_message>
<xml_diff>
--- a/Quantum-enhanced Markov chain Monte Carlo.pptx
+++ b/Quantum-enhanced Markov chain Monte Carlo.pptx
@@ -18,8 +18,8 @@
     <p:sldId id="270" r:id="rId12"/>
     <p:sldId id="271" r:id="rId13"/>
     <p:sldId id="272" r:id="rId14"/>
-    <p:sldId id="273" r:id="rId15"/>
-    <p:sldId id="263" r:id="rId16"/>
+    <p:sldId id="263" r:id="rId15"/>
+    <p:sldId id="273" r:id="rId16"/>
     <p:sldId id="265" r:id="rId17"/>
   </p:sldIdLst>
   <p:sldSz cx="12192000" cy="6858000"/>
@@ -130,7 +130,7 @@
 <file path=ppt/revisionInfo.xml><?xml version="1.0" encoding="utf-8"?>
 <p1510:revInfo xmlns:a="http://schemas.openxmlformats.org/drawingml/2006/main" xmlns:r="http://schemas.openxmlformats.org/officeDocument/2006/relationships" xmlns:p1510="http://schemas.microsoft.com/office/powerpoint/2015/10/main">
   <p1510:revLst>
-    <p1510:client id="{A321B135-221B-40EB-ACBB-F6C872DC3AAF}" v="1464" dt="2022-06-19T12:42:26.552"/>
+    <p1510:client id="{A321B135-221B-40EB-ACBB-F6C872DC3AAF}" v="1714" dt="2022-06-19T22:07:16.269"/>
   </p1510:revLst>
 </p1510:revInfo>
 </file>
@@ -140,12 +140,12 @@
   <pc:docChgLst>
     <pc:chgData name="Yunzhe Zheng" userId="729aa177-6b21-4cdc-b189-bdf2e662bdbe" providerId="ADAL" clId="{A321B135-221B-40EB-ACBB-F6C872DC3AAF}"/>
     <pc:docChg chg="undo custSel addSld delSld modSld modMainMaster">
-      <pc:chgData name="Yunzhe Zheng" userId="729aa177-6b21-4cdc-b189-bdf2e662bdbe" providerId="ADAL" clId="{A321B135-221B-40EB-ACBB-F6C872DC3AAF}" dt="2022-06-19T12:47:14.820" v="5503" actId="20577"/>
+      <pc:chgData name="Yunzhe Zheng" userId="729aa177-6b21-4cdc-b189-bdf2e662bdbe" providerId="ADAL" clId="{A321B135-221B-40EB-ACBB-F6C872DC3AAF}" dt="2022-06-19T22:09:08.580" v="7089" actId="1076"/>
       <pc:docMkLst>
         <pc:docMk/>
       </pc:docMkLst>
       <pc:sldChg chg="modSp mod">
-        <pc:chgData name="Yunzhe Zheng" userId="729aa177-6b21-4cdc-b189-bdf2e662bdbe" providerId="ADAL" clId="{A321B135-221B-40EB-ACBB-F6C872DC3AAF}" dt="2022-06-19T12:38:04.787" v="5305" actId="20577"/>
+        <pc:chgData name="Yunzhe Zheng" userId="729aa177-6b21-4cdc-b189-bdf2e662bdbe" providerId="ADAL" clId="{A321B135-221B-40EB-ACBB-F6C872DC3AAF}" dt="2022-06-19T22:09:08.580" v="7089" actId="1076"/>
         <pc:sldMkLst>
           <pc:docMk/>
           <pc:sldMk cId="2466513294" sldId="257"/>
@@ -159,7 +159,7 @@
           </ac:spMkLst>
         </pc:spChg>
         <pc:spChg chg="mod">
-          <ac:chgData name="Yunzhe Zheng" userId="729aa177-6b21-4cdc-b189-bdf2e662bdbe" providerId="ADAL" clId="{A321B135-221B-40EB-ACBB-F6C872DC3AAF}" dt="2022-06-19T12:38:01.073" v="5301" actId="14100"/>
+          <ac:chgData name="Yunzhe Zheng" userId="729aa177-6b21-4cdc-b189-bdf2e662bdbe" providerId="ADAL" clId="{A321B135-221B-40EB-ACBB-F6C872DC3AAF}" dt="2022-06-19T22:09:04.963" v="7088" actId="20577"/>
           <ac:spMkLst>
             <pc:docMk/>
             <pc:sldMk cId="2466513294" sldId="257"/>
@@ -167,7 +167,7 @@
           </ac:spMkLst>
         </pc:spChg>
         <pc:picChg chg="mod">
-          <ac:chgData name="Yunzhe Zheng" userId="729aa177-6b21-4cdc-b189-bdf2e662bdbe" providerId="ADAL" clId="{A321B135-221B-40EB-ACBB-F6C872DC3AAF}" dt="2022-06-17T23:26:56.272" v="1553" actId="1076"/>
+          <ac:chgData name="Yunzhe Zheng" userId="729aa177-6b21-4cdc-b189-bdf2e662bdbe" providerId="ADAL" clId="{A321B135-221B-40EB-ACBB-F6C872DC3AAF}" dt="2022-06-19T22:09:08.580" v="7089" actId="1076"/>
           <ac:picMkLst>
             <pc:docMk/>
             <pc:sldMk cId="2466513294" sldId="257"/>
@@ -221,8 +221,8 @@
           </ac:picMkLst>
         </pc:picChg>
       </pc:sldChg>
-      <pc:sldChg chg="modSp mod">
-        <pc:chgData name="Yunzhe Zheng" userId="729aa177-6b21-4cdc-b189-bdf2e662bdbe" providerId="ADAL" clId="{A321B135-221B-40EB-ACBB-F6C872DC3AAF}" dt="2022-06-19T12:37:38.531" v="5294" actId="20577"/>
+      <pc:sldChg chg="addSp modSp mod">
+        <pc:chgData name="Yunzhe Zheng" userId="729aa177-6b21-4cdc-b189-bdf2e662bdbe" providerId="ADAL" clId="{A321B135-221B-40EB-ACBB-F6C872DC3AAF}" dt="2022-06-19T22:08:09.616" v="7072" actId="1076"/>
         <pc:sldMkLst>
           <pc:docMk/>
           <pc:sldMk cId="3900287515" sldId="261"/>
@@ -235,6 +235,30 @@
             <ac:spMk id="3" creationId="{3FA98A39-F605-ADC7-146C-AFEEB8272707}"/>
           </ac:spMkLst>
         </pc:spChg>
+        <pc:picChg chg="mod">
+          <ac:chgData name="Yunzhe Zheng" userId="729aa177-6b21-4cdc-b189-bdf2e662bdbe" providerId="ADAL" clId="{A321B135-221B-40EB-ACBB-F6C872DC3AAF}" dt="2022-06-19T22:07:56.293" v="7066" actId="1076"/>
+          <ac:picMkLst>
+            <pc:docMk/>
+            <pc:sldMk cId="3900287515" sldId="261"/>
+            <ac:picMk id="5" creationId="{9D0AAD47-B9A4-3B22-9CC4-D0A5DAD41161}"/>
+          </ac:picMkLst>
+        </pc:picChg>
+        <pc:picChg chg="add mod">
+          <ac:chgData name="Yunzhe Zheng" userId="729aa177-6b21-4cdc-b189-bdf2e662bdbe" providerId="ADAL" clId="{A321B135-221B-40EB-ACBB-F6C872DC3AAF}" dt="2022-06-19T22:07:57.955" v="7067" actId="1076"/>
+          <ac:picMkLst>
+            <pc:docMk/>
+            <pc:sldMk cId="3900287515" sldId="261"/>
+            <ac:picMk id="8" creationId="{8F41EBEC-BA7F-7CD9-549C-759E6D2738A7}"/>
+          </ac:picMkLst>
+        </pc:picChg>
+        <pc:picChg chg="add mod">
+          <ac:chgData name="Yunzhe Zheng" userId="729aa177-6b21-4cdc-b189-bdf2e662bdbe" providerId="ADAL" clId="{A321B135-221B-40EB-ACBB-F6C872DC3AAF}" dt="2022-06-19T22:08:09.616" v="7072" actId="1076"/>
+          <ac:picMkLst>
+            <pc:docMk/>
+            <pc:sldMk cId="3900287515" sldId="261"/>
+            <ac:picMk id="10" creationId="{EE82A043-95B2-F73C-AFA1-398604D07A8E}"/>
+          </ac:picMkLst>
+        </pc:picChg>
       </pc:sldChg>
       <pc:sldChg chg="modSp mod">
         <pc:chgData name="Yunzhe Zheng" userId="729aa177-6b21-4cdc-b189-bdf2e662bdbe" providerId="ADAL" clId="{A321B135-221B-40EB-ACBB-F6C872DC3AAF}" dt="2022-06-18T09:15:16.297" v="1816" actId="14100"/>
@@ -251,8 +275,8 @@
           </ac:spMkLst>
         </pc:spChg>
       </pc:sldChg>
-      <pc:sldChg chg="addSp modSp new mod">
-        <pc:chgData name="Yunzhe Zheng" userId="729aa177-6b21-4cdc-b189-bdf2e662bdbe" providerId="ADAL" clId="{A321B135-221B-40EB-ACBB-F6C872DC3AAF}" dt="2022-06-18T14:49:55.992" v="5251" actId="1076"/>
+      <pc:sldChg chg="addSp delSp modSp new mod">
+        <pc:chgData name="Yunzhe Zheng" userId="729aa177-6b21-4cdc-b189-bdf2e662bdbe" providerId="ADAL" clId="{A321B135-221B-40EB-ACBB-F6C872DC3AAF}" dt="2022-06-19T21:51:11.835" v="5909" actId="1076"/>
         <pc:sldMkLst>
           <pc:docMk/>
           <pc:sldMk cId="3574907777" sldId="263"/>
@@ -274,15 +298,15 @@
           </ac:spMkLst>
         </pc:spChg>
         <pc:picChg chg="add mod">
-          <ac:chgData name="Yunzhe Zheng" userId="729aa177-6b21-4cdc-b189-bdf2e662bdbe" providerId="ADAL" clId="{A321B135-221B-40EB-ACBB-F6C872DC3AAF}" dt="2022-06-12T10:38:50.414" v="1019" actId="1076"/>
+          <ac:chgData name="Yunzhe Zheng" userId="729aa177-6b21-4cdc-b189-bdf2e662bdbe" providerId="ADAL" clId="{A321B135-221B-40EB-ACBB-F6C872DC3AAF}" dt="2022-06-19T21:51:11.835" v="5909" actId="1076"/>
           <ac:picMkLst>
             <pc:docMk/>
             <pc:sldMk cId="3574907777" sldId="263"/>
             <ac:picMk id="5" creationId="{19AEDC5B-8E50-9721-77C4-1D92BE37F309}"/>
           </ac:picMkLst>
         </pc:picChg>
-        <pc:picChg chg="add mod">
-          <ac:chgData name="Yunzhe Zheng" userId="729aa177-6b21-4cdc-b189-bdf2e662bdbe" providerId="ADAL" clId="{A321B135-221B-40EB-ACBB-F6C872DC3AAF}" dt="2022-06-18T14:49:55.992" v="5251" actId="1076"/>
+        <pc:picChg chg="add del mod">
+          <ac:chgData name="Yunzhe Zheng" userId="729aa177-6b21-4cdc-b189-bdf2e662bdbe" providerId="ADAL" clId="{A321B135-221B-40EB-ACBB-F6C872DC3AAF}" dt="2022-06-19T21:51:10.870" v="5908" actId="21"/>
           <ac:picMkLst>
             <pc:docMk/>
             <pc:sldMk cId="3574907777" sldId="263"/>
@@ -561,18 +585,34 @@
           </ac:cxnSpMkLst>
         </pc:cxnChg>
       </pc:sldChg>
-      <pc:sldChg chg="modSp new mod">
-        <pc:chgData name="Yunzhe Zheng" userId="729aa177-6b21-4cdc-b189-bdf2e662bdbe" providerId="ADAL" clId="{A321B135-221B-40EB-ACBB-F6C872DC3AAF}" dt="2022-06-19T12:43:24.141" v="5454" actId="20577"/>
+      <pc:sldChg chg="addSp delSp modSp new mod">
+        <pc:chgData name="Yunzhe Zheng" userId="729aa177-6b21-4cdc-b189-bdf2e662bdbe" providerId="ADAL" clId="{A321B135-221B-40EB-ACBB-F6C872DC3AAF}" dt="2022-06-19T22:06:29.326" v="6996" actId="113"/>
         <pc:sldMkLst>
           <pc:docMk/>
           <pc:sldMk cId="328022018" sldId="265"/>
         </pc:sldMkLst>
         <pc:spChg chg="mod">
-          <ac:chgData name="Yunzhe Zheng" userId="729aa177-6b21-4cdc-b189-bdf2e662bdbe" providerId="ADAL" clId="{A321B135-221B-40EB-ACBB-F6C872DC3AAF}" dt="2022-06-19T12:43:24.141" v="5454" actId="20577"/>
+          <ac:chgData name="Yunzhe Zheng" userId="729aa177-6b21-4cdc-b189-bdf2e662bdbe" providerId="ADAL" clId="{A321B135-221B-40EB-ACBB-F6C872DC3AAF}" dt="2022-06-19T22:06:08.607" v="6971" actId="20577"/>
           <ac:spMkLst>
             <pc:docMk/>
             <pc:sldMk cId="328022018" sldId="265"/>
             <ac:spMk id="2" creationId="{EA2224FC-C170-6E3F-E7F6-D54EF23DDCC1}"/>
+          </ac:spMkLst>
+        </pc:spChg>
+        <pc:spChg chg="mod">
+          <ac:chgData name="Yunzhe Zheng" userId="729aa177-6b21-4cdc-b189-bdf2e662bdbe" providerId="ADAL" clId="{A321B135-221B-40EB-ACBB-F6C872DC3AAF}" dt="2022-06-19T22:06:29.326" v="6996" actId="113"/>
+          <ac:spMkLst>
+            <pc:docMk/>
+            <pc:sldMk cId="328022018" sldId="265"/>
+            <ac:spMk id="3" creationId="{13A97F90-6E1C-CFF9-BB41-56DDCAEED6B9}"/>
+          </ac:spMkLst>
+        </pc:spChg>
+        <pc:spChg chg="add del">
+          <ac:chgData name="Yunzhe Zheng" userId="729aa177-6b21-4cdc-b189-bdf2e662bdbe" providerId="ADAL" clId="{A321B135-221B-40EB-ACBB-F6C872DC3AAF}" dt="2022-06-19T22:05:27.931" v="6920"/>
+          <ac:spMkLst>
+            <pc:docMk/>
+            <pc:sldMk cId="328022018" sldId="265"/>
+            <ac:spMk id="4" creationId="{2F633E8A-2CCE-3045-9958-8D10FE90E88B}"/>
           </ac:spMkLst>
         </pc:spChg>
       </pc:sldChg>
@@ -875,7 +915,7 @@
         </pc:picChg>
       </pc:sldChg>
       <pc:sldChg chg="addSp modSp new mod">
-        <pc:chgData name="Yunzhe Zheng" userId="729aa177-6b21-4cdc-b189-bdf2e662bdbe" providerId="ADAL" clId="{A321B135-221B-40EB-ACBB-F6C872DC3AAF}" dt="2022-06-18T14:38:52.540" v="4722" actId="20577"/>
+        <pc:chgData name="Yunzhe Zheng" userId="729aa177-6b21-4cdc-b189-bdf2e662bdbe" providerId="ADAL" clId="{A321B135-221B-40EB-ACBB-F6C872DC3AAF}" dt="2022-06-19T22:07:19.808" v="7061" actId="1076"/>
         <pc:sldMkLst>
           <pc:docMk/>
           <pc:sldMk cId="737192473" sldId="272"/>
@@ -889,7 +929,7 @@
           </ac:spMkLst>
         </pc:spChg>
         <pc:spChg chg="mod">
-          <ac:chgData name="Yunzhe Zheng" userId="729aa177-6b21-4cdc-b189-bdf2e662bdbe" providerId="ADAL" clId="{A321B135-221B-40EB-ACBB-F6C872DC3AAF}" dt="2022-06-18T14:38:52.540" v="4722" actId="20577"/>
+          <ac:chgData name="Yunzhe Zheng" userId="729aa177-6b21-4cdc-b189-bdf2e662bdbe" providerId="ADAL" clId="{A321B135-221B-40EB-ACBB-F6C872DC3AAF}" dt="2022-06-19T22:07:16.269" v="7060" actId="20577"/>
           <ac:spMkLst>
             <pc:docMk/>
             <pc:sldMk cId="737192473" sldId="272"/>
@@ -897,7 +937,7 @@
           </ac:spMkLst>
         </pc:spChg>
         <pc:picChg chg="add mod">
-          <ac:chgData name="Yunzhe Zheng" userId="729aa177-6b21-4cdc-b189-bdf2e662bdbe" providerId="ADAL" clId="{A321B135-221B-40EB-ACBB-F6C872DC3AAF}" dt="2022-06-18T12:59:06.439" v="3942" actId="1076"/>
+          <ac:chgData name="Yunzhe Zheng" userId="729aa177-6b21-4cdc-b189-bdf2e662bdbe" providerId="ADAL" clId="{A321B135-221B-40EB-ACBB-F6C872DC3AAF}" dt="2022-06-19T22:07:19.808" v="7061" actId="1076"/>
           <ac:picMkLst>
             <pc:docMk/>
             <pc:sldMk cId="737192473" sldId="272"/>
@@ -905,8 +945,39 @@
           </ac:picMkLst>
         </pc:picChg>
       </pc:sldChg>
-      <pc:sldChg chg="modSp new mod">
-        <pc:chgData name="Yunzhe Zheng" userId="729aa177-6b21-4cdc-b189-bdf2e662bdbe" providerId="ADAL" clId="{A321B135-221B-40EB-ACBB-F6C872DC3AAF}" dt="2022-06-19T12:47:14.820" v="5503" actId="20577"/>
+      <pc:sldChg chg="addSp modSp new mod">
+        <pc:chgData name="Yunzhe Zheng" userId="729aa177-6b21-4cdc-b189-bdf2e662bdbe" providerId="ADAL" clId="{A321B135-221B-40EB-ACBB-F6C872DC3AAF}" dt="2022-06-19T22:02:47.293" v="6560" actId="1076"/>
+        <pc:sldMkLst>
+          <pc:docMk/>
+          <pc:sldMk cId="456839910" sldId="273"/>
+        </pc:sldMkLst>
+        <pc:spChg chg="mod">
+          <ac:chgData name="Yunzhe Zheng" userId="729aa177-6b21-4cdc-b189-bdf2e662bdbe" providerId="ADAL" clId="{A321B135-221B-40EB-ACBB-F6C872DC3AAF}" dt="2022-06-19T21:53:06.601" v="6005" actId="21"/>
+          <ac:spMkLst>
+            <pc:docMk/>
+            <pc:sldMk cId="456839910" sldId="273"/>
+            <ac:spMk id="2" creationId="{8BC4A1B4-FE9A-6057-58AB-34503A1ED1ED}"/>
+          </ac:spMkLst>
+        </pc:spChg>
+        <pc:spChg chg="mod">
+          <ac:chgData name="Yunzhe Zheng" userId="729aa177-6b21-4cdc-b189-bdf2e662bdbe" providerId="ADAL" clId="{A321B135-221B-40EB-ACBB-F6C872DC3AAF}" dt="2022-06-19T22:02:40.209" v="6559" actId="20577"/>
+          <ac:spMkLst>
+            <pc:docMk/>
+            <pc:sldMk cId="456839910" sldId="273"/>
+            <ac:spMk id="3" creationId="{67AF985B-A8B8-9691-73EA-BEB48F227264}"/>
+          </ac:spMkLst>
+        </pc:spChg>
+        <pc:picChg chg="add mod">
+          <ac:chgData name="Yunzhe Zheng" userId="729aa177-6b21-4cdc-b189-bdf2e662bdbe" providerId="ADAL" clId="{A321B135-221B-40EB-ACBB-F6C872DC3AAF}" dt="2022-06-19T22:02:47.293" v="6560" actId="1076"/>
+          <ac:picMkLst>
+            <pc:docMk/>
+            <pc:sldMk cId="456839910" sldId="273"/>
+            <ac:picMk id="4" creationId="{6D279F7B-0944-F79A-D348-A33F75DA21F3}"/>
+          </ac:picMkLst>
+        </pc:picChg>
+      </pc:sldChg>
+      <pc:sldChg chg="addSp delSp modSp new del mod">
+        <pc:chgData name="Yunzhe Zheng" userId="729aa177-6b21-4cdc-b189-bdf2e662bdbe" providerId="ADAL" clId="{A321B135-221B-40EB-ACBB-F6C872DC3AAF}" dt="2022-06-19T21:49:21.373" v="5881" actId="2696"/>
         <pc:sldMkLst>
           <pc:docMk/>
           <pc:sldMk cId="2650923407" sldId="273"/>
@@ -919,14 +990,62 @@
             <ac:spMk id="2" creationId="{6C4E0142-F281-49C7-4CAB-6A234E863487}"/>
           </ac:spMkLst>
         </pc:spChg>
-        <pc:spChg chg="mod">
-          <ac:chgData name="Yunzhe Zheng" userId="729aa177-6b21-4cdc-b189-bdf2e662bdbe" providerId="ADAL" clId="{A321B135-221B-40EB-ACBB-F6C872DC3AAF}" dt="2022-06-19T12:47:14.820" v="5503" actId="20577"/>
+        <pc:spChg chg="add del mod">
+          <ac:chgData name="Yunzhe Zheng" userId="729aa177-6b21-4cdc-b189-bdf2e662bdbe" providerId="ADAL" clId="{A321B135-221B-40EB-ACBB-F6C872DC3AAF}" dt="2022-06-19T12:54:33.953" v="5788" actId="20577"/>
           <ac:spMkLst>
             <pc:docMk/>
             <pc:sldMk cId="2650923407" sldId="273"/>
             <ac:spMk id="3" creationId="{C8A55B35-B6F7-86BD-846E-C005209E76A3}"/>
           </ac:spMkLst>
         </pc:spChg>
+        <pc:spChg chg="add mod">
+          <ac:chgData name="Yunzhe Zheng" userId="729aa177-6b21-4cdc-b189-bdf2e662bdbe" providerId="ADAL" clId="{A321B135-221B-40EB-ACBB-F6C872DC3AAF}" dt="2022-06-19T12:55:42.855" v="5880" actId="1076"/>
+          <ac:spMkLst>
+            <pc:docMk/>
+            <pc:sldMk cId="2650923407" sldId="273"/>
+            <ac:spMk id="13" creationId="{91AF4D5F-B6B0-E983-6868-78BA41C49575}"/>
+          </ac:spMkLst>
+        </pc:spChg>
+        <pc:picChg chg="add del mod ord">
+          <ac:chgData name="Yunzhe Zheng" userId="729aa177-6b21-4cdc-b189-bdf2e662bdbe" providerId="ADAL" clId="{A321B135-221B-40EB-ACBB-F6C872DC3AAF}" dt="2022-06-19T12:49:13.320" v="5505" actId="22"/>
+          <ac:picMkLst>
+            <pc:docMk/>
+            <pc:sldMk cId="2650923407" sldId="273"/>
+            <ac:picMk id="5" creationId="{1A94EEA5-2152-7A22-21E9-6FECB5202FB7}"/>
+          </ac:picMkLst>
+        </pc:picChg>
+        <pc:picChg chg="add mod modCrop">
+          <ac:chgData name="Yunzhe Zheng" userId="729aa177-6b21-4cdc-b189-bdf2e662bdbe" providerId="ADAL" clId="{A321B135-221B-40EB-ACBB-F6C872DC3AAF}" dt="2022-06-19T12:55:37.517" v="5879" actId="1076"/>
+          <ac:picMkLst>
+            <pc:docMk/>
+            <pc:sldMk cId="2650923407" sldId="273"/>
+            <ac:picMk id="6" creationId="{61BA0C59-3FB1-40F1-4FB3-54873FDCE901}"/>
+          </ac:picMkLst>
+        </pc:picChg>
+        <pc:picChg chg="add del mod ord">
+          <ac:chgData name="Yunzhe Zheng" userId="729aa177-6b21-4cdc-b189-bdf2e662bdbe" providerId="ADAL" clId="{A321B135-221B-40EB-ACBB-F6C872DC3AAF}" dt="2022-06-19T12:53:27.343" v="5768" actId="21"/>
+          <ac:picMkLst>
+            <pc:docMk/>
+            <pc:sldMk cId="2650923407" sldId="273"/>
+            <ac:picMk id="8" creationId="{646B4CCC-4C9F-9434-9653-D6A3AC994531}"/>
+          </ac:picMkLst>
+        </pc:picChg>
+        <pc:picChg chg="add mod">
+          <ac:chgData name="Yunzhe Zheng" userId="729aa177-6b21-4cdc-b189-bdf2e662bdbe" providerId="ADAL" clId="{A321B135-221B-40EB-ACBB-F6C872DC3AAF}" dt="2022-06-19T12:53:55.336" v="5775" actId="1076"/>
+          <ac:picMkLst>
+            <pc:docMk/>
+            <pc:sldMk cId="2650923407" sldId="273"/>
+            <ac:picMk id="10" creationId="{EE4CDCE4-D82E-F675-40C4-106738F16C66}"/>
+          </ac:picMkLst>
+        </pc:picChg>
+        <pc:picChg chg="add mod">
+          <ac:chgData name="Yunzhe Zheng" userId="729aa177-6b21-4cdc-b189-bdf2e662bdbe" providerId="ADAL" clId="{A321B135-221B-40EB-ACBB-F6C872DC3AAF}" dt="2022-06-19T12:54:13.440" v="5784" actId="1076"/>
+          <ac:picMkLst>
+            <pc:docMk/>
+            <pc:sldMk cId="2650923407" sldId="273"/>
+            <ac:picMk id="12" creationId="{4F22B47A-8DE9-E244-B911-D3A17C24131E}"/>
+          </ac:picMkLst>
+        </pc:picChg>
       </pc:sldChg>
       <pc:sldMasterChg chg="setBg modSldLayout">
         <pc:chgData name="Yunzhe Zheng" userId="729aa177-6b21-4cdc-b189-bdf2e662bdbe" providerId="ADAL" clId="{A321B135-221B-40EB-ACBB-F6C872DC3AAF}" dt="2022-06-18T12:41:08.354" v="2993"/>
@@ -5881,8 +6000,8 @@
           </a:p>
         </p:txBody>
       </p:sp>
-      <mc:AlternateContent xmlns:mc="http://schemas.openxmlformats.org/markup-compatibility/2006" xmlns:a14="http://schemas.microsoft.com/office/drawing/2010/main">
-        <mc:Choice Requires="a14">
+      <mc:AlternateContent xmlns:mc="http://schemas.openxmlformats.org/markup-compatibility/2006">
+        <mc:Choice xmlns:a14="http://schemas.microsoft.com/office/drawing/2010/main" Requires="a14">
           <p:sp>
             <p:nvSpPr>
               <p:cNvPr id="3" name="Content Placeholder 2">
@@ -5982,92 +6101,7 @@
                 </a14:m>
                 <a:r>
                   <a:rPr lang="en-US" altLang="zh-CN" dirty="0"/>
-                  <a:t> arbitrarily (since </a:t>
-                </a:r>
-                <a14:m>
-                  <m:oMath xmlns:m="http://schemas.openxmlformats.org/officeDocument/2006/math">
-                    <m:r>
-                      <m:rPr>
-                        <m:sty m:val="p"/>
-                      </m:rPr>
-                      <a:rPr lang="en-US" altLang="zh-CN">
-                        <a:solidFill>
-                          <a:schemeClr val="tx1"/>
-                        </a:solidFill>
-                        <a:latin typeface="Cambria Math" panose="02040503050406030204" pitchFamily="18" charset="0"/>
-                        <a:ea typeface="Cambria Math" panose="02040503050406030204" pitchFamily="18" charset="0"/>
-                      </a:rPr>
-                      <m:t>Q</m:t>
-                    </m:r>
-                    <m:d>
-                      <m:dPr>
-                        <m:ctrlPr>
-                          <a:rPr lang="en-US" altLang="zh-CN" i="1">
-                            <a:solidFill>
-                              <a:schemeClr val="tx1"/>
-                            </a:solidFill>
-                            <a:latin typeface="Cambria Math" panose="02040503050406030204" pitchFamily="18" charset="0"/>
-                            <a:ea typeface="Cambria Math" panose="02040503050406030204" pitchFamily="18" charset="0"/>
-                          </a:rPr>
-                        </m:ctrlPr>
-                      </m:dPr>
-                      <m:e>
-                        <m:sSup>
-                          <m:sSupPr>
-                            <m:ctrlPr>
-                              <a:rPr lang="en-US" altLang="zh-CN" i="1">
-                                <a:solidFill>
-                                  <a:schemeClr val="tx1"/>
-                                </a:solidFill>
-                                <a:latin typeface="Cambria Math" panose="02040503050406030204" pitchFamily="18" charset="0"/>
-                                <a:ea typeface="Cambria Math" panose="02040503050406030204" pitchFamily="18" charset="0"/>
-                              </a:rPr>
-                            </m:ctrlPr>
-                          </m:sSupPr>
-                          <m:e>
-                            <m:r>
-                              <a:rPr lang="en-US" altLang="zh-CN" b="1" i="1">
-                                <a:solidFill>
-                                  <a:schemeClr val="tx1"/>
-                                </a:solidFill>
-                                <a:latin typeface="Cambria Math" panose="02040503050406030204" pitchFamily="18" charset="0"/>
-                                <a:ea typeface="Cambria Math" panose="02040503050406030204" pitchFamily="18" charset="0"/>
-                              </a:rPr>
-                              <m:t>𝒔</m:t>
-                            </m:r>
-                          </m:e>
-                          <m:sup>
-                            <m:r>
-                              <a:rPr lang="en-US" altLang="zh-CN" i="1">
-                                <a:solidFill>
-                                  <a:schemeClr val="tx1"/>
-                                </a:solidFill>
-                                <a:latin typeface="Cambria Math" panose="02040503050406030204" pitchFamily="18" charset="0"/>
-                                <a:ea typeface="Cambria Math" panose="02040503050406030204" pitchFamily="18" charset="0"/>
-                              </a:rPr>
-                              <m:t>′</m:t>
-                            </m:r>
-                          </m:sup>
-                        </m:sSup>
-                      </m:e>
-                      <m:e>
-                        <m:r>
-                          <a:rPr lang="en-US" altLang="zh-CN" b="1" i="1">
-                            <a:solidFill>
-                              <a:schemeClr val="tx1"/>
-                            </a:solidFill>
-                            <a:latin typeface="Cambria Math" panose="02040503050406030204" pitchFamily="18" charset="0"/>
-                            <a:ea typeface="Cambria Math" panose="02040503050406030204" pitchFamily="18" charset="0"/>
-                          </a:rPr>
-                          <m:t>𝒔</m:t>
-                        </m:r>
-                      </m:e>
-                    </m:d>
-                  </m:oMath>
-                </a14:m>
-                <a:r>
-                  <a:rPr lang="en-US" altLang="zh-CN" dirty="0"/>
-                  <a:t> is arbitrary. )</a:t>
+                  <a:t> in a given strategy (e.g. uniform or local)</a:t>
                 </a:r>
               </a:p>
               <a:p>
@@ -6444,7 +6478,7 @@
             </p:txBody>
           </p:sp>
         </mc:Choice>
-        <mc:Fallback xmlns="">
+        <mc:Fallback>
           <p:sp>
             <p:nvSpPr>
               <p:cNvPr id="3" name="Content Placeholder 2">
@@ -6510,7 +6544,7 @@
         </p:blipFill>
         <p:spPr>
           <a:xfrm>
-            <a:off x="9043480" y="116014"/>
+            <a:off x="9061953" y="0"/>
             <a:ext cx="2776943" cy="1702340"/>
           </a:xfrm>
           <a:prstGeom prst="rect">
@@ -6532,92 +6566,6 @@
 </file>
 
 <file path=ppt/slides/slide14.xml><?xml version="1.0" encoding="utf-8"?>
-<p:sld xmlns:a="http://schemas.openxmlformats.org/drawingml/2006/main" xmlns:r="http://schemas.openxmlformats.org/officeDocument/2006/relationships" xmlns:p="http://schemas.openxmlformats.org/presentationml/2006/main">
-  <p:cSld>
-    <p:spTree>
-      <p:nvGrpSpPr>
-        <p:cNvPr id="1" name=""/>
-        <p:cNvGrpSpPr/>
-        <p:nvPr/>
-      </p:nvGrpSpPr>
-      <p:grpSpPr>
-        <a:xfrm>
-          <a:off x="0" y="0"/>
-          <a:ext cx="0" cy="0"/>
-          <a:chOff x="0" y="0"/>
-          <a:chExt cx="0" cy="0"/>
-        </a:xfrm>
-      </p:grpSpPr>
-      <p:sp>
-        <p:nvSpPr>
-          <p:cNvPr id="2" name="Title 1">
-            <a:extLst>
-              <a:ext uri="{FF2B5EF4-FFF2-40B4-BE49-F238E27FC236}">
-                <a16:creationId xmlns:a16="http://schemas.microsoft.com/office/drawing/2014/main" id="{6C4E0142-F281-49C7-4CAB-6A234E863487}"/>
-              </a:ext>
-            </a:extLst>
-          </p:cNvPr>
-          <p:cNvSpPr>
-            <a:spLocks noGrp="1"/>
-          </p:cNvSpPr>
-          <p:nvPr>
-            <p:ph type="title"/>
-          </p:nvPr>
-        </p:nvSpPr>
-        <p:spPr/>
-        <p:txBody>
-          <a:bodyPr>
-            <a:normAutofit fontScale="90000"/>
-          </a:bodyPr>
-          <a:lstStyle/>
-          <a:p>
-            <a:r>
-              <a:rPr lang="en-US" altLang="zh-CN" dirty="0"/>
-              <a:t>Code implementation</a:t>
-            </a:r>
-            <a:endParaRPr lang="zh-CN" altLang="en-US" dirty="0"/>
-          </a:p>
-        </p:txBody>
-      </p:sp>
-      <p:sp>
-        <p:nvSpPr>
-          <p:cNvPr id="3" name="Content Placeholder 2">
-            <a:extLst>
-              <a:ext uri="{FF2B5EF4-FFF2-40B4-BE49-F238E27FC236}">
-                <a16:creationId xmlns:a16="http://schemas.microsoft.com/office/drawing/2014/main" id="{C8A55B35-B6F7-86BD-846E-C005209E76A3}"/>
-              </a:ext>
-            </a:extLst>
-          </p:cNvPr>
-          <p:cNvSpPr>
-            <a:spLocks noGrp="1"/>
-          </p:cNvSpPr>
-          <p:nvPr>
-            <p:ph idx="1"/>
-          </p:nvPr>
-        </p:nvSpPr>
-        <p:spPr/>
-        <p:txBody>
-          <a:bodyPr/>
-          <a:lstStyle/>
-          <a:p>
-            <a:endParaRPr lang="zh-CN" altLang="en-US" dirty="0"/>
-          </a:p>
-        </p:txBody>
-      </p:sp>
-    </p:spTree>
-    <p:extLst>
-      <p:ext uri="{BB962C8B-B14F-4D97-AF65-F5344CB8AC3E}">
-        <p14:creationId xmlns:p14="http://schemas.microsoft.com/office/powerpoint/2010/main" val="2650923407"/>
-      </p:ext>
-    </p:extLst>
-  </p:cSld>
-  <p:clrMapOvr>
-    <a:masterClrMapping/>
-  </p:clrMapOvr>
-</p:sld>
-</file>
-
-<file path=ppt/slides/slide15.xml><?xml version="1.0" encoding="utf-8"?>
 <p:sld xmlns:a="http://schemas.openxmlformats.org/drawingml/2006/main" xmlns:r="http://schemas.openxmlformats.org/officeDocument/2006/relationships" xmlns:p="http://schemas.openxmlformats.org/presentationml/2006/main">
   <p:cSld>
     <p:spTree>
@@ -6729,38 +6677,8 @@
         </p:blipFill>
         <p:spPr>
           <a:xfrm>
-            <a:off x="6234584" y="0"/>
-            <a:ext cx="2336313" cy="1174719"/>
-          </a:xfrm>
-          <a:prstGeom prst="rect">
-            <a:avLst/>
-          </a:prstGeom>
-        </p:spPr>
-      </p:pic>
-      <p:pic>
-        <p:nvPicPr>
-          <p:cNvPr id="6" name="Picture 5">
-            <a:extLst>
-              <a:ext uri="{FF2B5EF4-FFF2-40B4-BE49-F238E27FC236}">
-                <a16:creationId xmlns:a16="http://schemas.microsoft.com/office/drawing/2014/main" id="{B16CFF25-537D-B5D1-C6DA-0392849B7CBB}"/>
-              </a:ext>
-            </a:extLst>
-          </p:cNvPr>
-          <p:cNvPicPr>
-            <a:picLocks noChangeAspect="1"/>
-          </p:cNvPicPr>
-          <p:nvPr/>
-        </p:nvPicPr>
-        <p:blipFill>
-          <a:blip r:embed="rId3"/>
-          <a:stretch>
-            <a:fillRect/>
-          </a:stretch>
-        </p:blipFill>
-        <p:spPr>
-          <a:xfrm>
-            <a:off x="471487" y="5934075"/>
-            <a:ext cx="3895725" cy="485775"/>
+            <a:off x="499196" y="3676803"/>
+            <a:ext cx="3835644" cy="1928596"/>
           </a:xfrm>
           <a:prstGeom prst="rect">
             <a:avLst/>
@@ -6782,7 +6700,7 @@
           <p:nvPr/>
         </p:nvPicPr>
         <p:blipFill>
-          <a:blip r:embed="rId4"/>
+          <a:blip r:embed="rId3"/>
           <a:stretch>
             <a:fillRect/>
           </a:stretch>
@@ -6801,6 +6719,338 @@
     <p:extLst>
       <p:ext uri="{BB962C8B-B14F-4D97-AF65-F5344CB8AC3E}">
         <p14:creationId xmlns:p14="http://schemas.microsoft.com/office/powerpoint/2010/main" val="3574907777"/>
+      </p:ext>
+    </p:extLst>
+  </p:cSld>
+  <p:clrMapOvr>
+    <a:masterClrMapping/>
+  </p:clrMapOvr>
+</p:sld>
+</file>
+
+<file path=ppt/slides/slide15.xml><?xml version="1.0" encoding="utf-8"?>
+<p:sld xmlns:a="http://schemas.openxmlformats.org/drawingml/2006/main" xmlns:r="http://schemas.openxmlformats.org/officeDocument/2006/relationships" xmlns:p="http://schemas.openxmlformats.org/presentationml/2006/main">
+  <p:cSld>
+    <p:spTree>
+      <p:nvGrpSpPr>
+        <p:cNvPr id="1" name=""/>
+        <p:cNvGrpSpPr/>
+        <p:nvPr/>
+      </p:nvGrpSpPr>
+      <p:grpSpPr>
+        <a:xfrm>
+          <a:off x="0" y="0"/>
+          <a:ext cx="0" cy="0"/>
+          <a:chOff x="0" y="0"/>
+          <a:chExt cx="0" cy="0"/>
+        </a:xfrm>
+      </p:grpSpPr>
+      <p:sp>
+        <p:nvSpPr>
+          <p:cNvPr id="2" name="Title 1">
+            <a:extLst>
+              <a:ext uri="{FF2B5EF4-FFF2-40B4-BE49-F238E27FC236}">
+                <a16:creationId xmlns:a16="http://schemas.microsoft.com/office/drawing/2014/main" id="{8BC4A1B4-FE9A-6057-58AB-34503A1ED1ED}"/>
+              </a:ext>
+            </a:extLst>
+          </p:cNvPr>
+          <p:cNvSpPr>
+            <a:spLocks noGrp="1"/>
+          </p:cNvSpPr>
+          <p:nvPr>
+            <p:ph type="title"/>
+          </p:nvPr>
+        </p:nvSpPr>
+        <p:spPr/>
+        <p:txBody>
+          <a:bodyPr>
+            <a:normAutofit fontScale="90000"/>
+          </a:bodyPr>
+          <a:lstStyle/>
+          <a:p>
+            <a:r>
+              <a:rPr lang="en-GB" altLang="zh-CN" dirty="0"/>
+              <a:t>Protein Folding</a:t>
+            </a:r>
+            <a:endParaRPr lang="zh-CN" altLang="en-US" dirty="0"/>
+          </a:p>
+        </p:txBody>
+      </p:sp>
+      <mc:AlternateContent xmlns:mc="http://schemas.openxmlformats.org/markup-compatibility/2006">
+        <mc:Choice xmlns:a14="http://schemas.microsoft.com/office/drawing/2010/main" Requires="a14">
+          <p:sp>
+            <p:nvSpPr>
+              <p:cNvPr id="3" name="Content Placeholder 2">
+                <a:extLst>
+                  <a:ext uri="{FF2B5EF4-FFF2-40B4-BE49-F238E27FC236}">
+                    <a16:creationId xmlns:a16="http://schemas.microsoft.com/office/drawing/2014/main" id="{67AF985B-A8B8-9691-73EA-BEB48F227264}"/>
+                  </a:ext>
+                </a:extLst>
+              </p:cNvPr>
+              <p:cNvSpPr>
+                <a:spLocks noGrp="1"/>
+              </p:cNvSpPr>
+              <p:nvPr>
+                <p:ph idx="1"/>
+              </p:nvPr>
+            </p:nvSpPr>
+            <p:spPr>
+              <a:xfrm>
+                <a:off x="607464" y="1253330"/>
+                <a:ext cx="10515600" cy="5304487"/>
+              </a:xfrm>
+            </p:spPr>
+            <p:txBody>
+              <a:bodyPr>
+                <a:normAutofit/>
+              </a:bodyPr>
+              <a:lstStyle/>
+              <a:p>
+                <a:r>
+                  <a:rPr lang="en-GB" altLang="zh-CN" dirty="0"/>
+                  <a:t>Protein is transformable: </a:t>
+                </a:r>
+              </a:p>
+              <a:p>
+                <a:pPr lvl="1"/>
+                <a:r>
+                  <a:rPr lang="en-GB" altLang="zh-CN" dirty="0"/>
+                  <a:t>One unfold </a:t>
+                </a:r>
+                <a:r>
+                  <a:rPr lang="en-GB" altLang="zh-CN" dirty="0" err="1"/>
+                  <a:t>aminoacid</a:t>
+                </a:r>
+                <a:r>
+                  <a:rPr lang="en-GB" altLang="zh-CN" dirty="0"/>
+                  <a:t> chain may have several target structures.</a:t>
+                </a:r>
+              </a:p>
+              <a:p>
+                <a:pPr lvl="1"/>
+                <a:r>
+                  <a:rPr lang="en-GB" altLang="zh-CN" dirty="0"/>
+                  <a:t>Protein could transform </a:t>
+                </a:r>
+                <a:r>
+                  <a:rPr lang="en-GB" altLang="zh-CN" dirty="0" err="1"/>
+                  <a:t>structrues</a:t>
+                </a:r>
+                <a:r>
+                  <a:rPr lang="en-GB" altLang="zh-CN" dirty="0"/>
+                  <a:t> between local minima states!</a:t>
+                </a:r>
+              </a:p>
+              <a:p>
+                <a:r>
+                  <a:rPr lang="en-GB" altLang="zh-CN" dirty="0"/>
+                  <a:t>Ground state is not enough to understand this behaviour.</a:t>
+                </a:r>
+              </a:p>
+              <a:p>
+                <a:r>
+                  <a:rPr lang="en-GB" altLang="zh-CN" b="0" dirty="0">
+                    <a:latin typeface="Cambria Math" panose="02040503050406030204" pitchFamily="18" charset="0"/>
+                  </a:rPr>
+                  <a:t>Hamiltonian:</a:t>
+                </a:r>
+              </a:p>
+              <a:p>
+                <a14:m>
+                  <m:oMath xmlns:m="http://schemas.openxmlformats.org/officeDocument/2006/math">
+                    <m:sSub>
+                      <m:sSubPr>
+                        <m:ctrlPr>
+                          <a:rPr lang="en-GB" altLang="zh-CN" b="0" i="1" smtClean="0">
+                            <a:latin typeface="Cambria Math" panose="02040503050406030204" pitchFamily="18" charset="0"/>
+                          </a:rPr>
+                        </m:ctrlPr>
+                      </m:sSubPr>
+                      <m:e>
+                        <m:r>
+                          <a:rPr lang="en-GB" altLang="zh-CN" b="0" i="1" smtClean="0">
+                            <a:latin typeface="Cambria Math" panose="02040503050406030204" pitchFamily="18" charset="0"/>
+                          </a:rPr>
+                          <m:t>𝐻</m:t>
+                        </m:r>
+                      </m:e>
+                      <m:sub>
+                        <m:r>
+                          <a:rPr lang="en-GB" altLang="zh-CN" b="0" i="1" smtClean="0">
+                            <a:latin typeface="Cambria Math" panose="02040503050406030204" pitchFamily="18" charset="0"/>
+                          </a:rPr>
+                          <m:t>𝑔𝑐</m:t>
+                        </m:r>
+                      </m:sub>
+                    </m:sSub>
+                  </m:oMath>
+                </a14:m>
+                <a:r>
+                  <a:rPr lang="en-GB" altLang="zh-CN" dirty="0"/>
+                  <a:t>: geometric constraint term.</a:t>
+                </a:r>
+              </a:p>
+              <a:p>
+                <a14:m>
+                  <m:oMath xmlns:m="http://schemas.openxmlformats.org/officeDocument/2006/math">
+                    <m:sSub>
+                      <m:sSubPr>
+                        <m:ctrlPr>
+                          <a:rPr lang="en-GB" altLang="zh-CN" b="0" i="1" smtClean="0">
+                            <a:latin typeface="Cambria Math" panose="02040503050406030204" pitchFamily="18" charset="0"/>
+                          </a:rPr>
+                        </m:ctrlPr>
+                      </m:sSubPr>
+                      <m:e>
+                        <m:r>
+                          <a:rPr lang="en-GB" altLang="zh-CN" b="0" i="1" smtClean="0">
+                            <a:latin typeface="Cambria Math" panose="02040503050406030204" pitchFamily="18" charset="0"/>
+                          </a:rPr>
+                          <m:t>𝐻</m:t>
+                        </m:r>
+                      </m:e>
+                      <m:sub>
+                        <m:r>
+                          <a:rPr lang="en-GB" altLang="zh-CN" b="0" i="1" smtClean="0">
+                            <a:latin typeface="Cambria Math" panose="02040503050406030204" pitchFamily="18" charset="0"/>
+                          </a:rPr>
+                          <m:t>𝑐h</m:t>
+                        </m:r>
+                      </m:sub>
+                    </m:sSub>
+                  </m:oMath>
+                </a14:m>
+                <a:r>
+                  <a:rPr lang="en-GB" altLang="zh-CN" dirty="0"/>
+                  <a:t>: chirality constraint term.</a:t>
+                </a:r>
+              </a:p>
+              <a:p>
+                <a14:m>
+                  <m:oMath xmlns:m="http://schemas.openxmlformats.org/officeDocument/2006/math">
+                    <m:sSub>
+                      <m:sSubPr>
+                        <m:ctrlPr>
+                          <a:rPr lang="en-GB" altLang="zh-CN" b="0" i="1" smtClean="0">
+                            <a:latin typeface="Cambria Math" panose="02040503050406030204" pitchFamily="18" charset="0"/>
+                          </a:rPr>
+                        </m:ctrlPr>
+                      </m:sSubPr>
+                      <m:e>
+                        <m:r>
+                          <a:rPr lang="en-GB" altLang="zh-CN" b="0" i="1" smtClean="0">
+                            <a:latin typeface="Cambria Math" panose="02040503050406030204" pitchFamily="18" charset="0"/>
+                          </a:rPr>
+                          <m:t>𝐻</m:t>
+                        </m:r>
+                      </m:e>
+                      <m:sub>
+                        <m:r>
+                          <a:rPr lang="en-GB" altLang="zh-CN" b="0" i="1" smtClean="0">
+                            <a:latin typeface="Cambria Math" panose="02040503050406030204" pitchFamily="18" charset="0"/>
+                          </a:rPr>
+                          <m:t>𝑖𝑛</m:t>
+                        </m:r>
+                      </m:sub>
+                    </m:sSub>
+                  </m:oMath>
+                </a14:m>
+                <a:r>
+                  <a:rPr lang="en-GB" altLang="zh-CN" dirty="0"/>
+                  <a:t>: interaction term</a:t>
+                </a:r>
+              </a:p>
+              <a:p>
+                <a:endParaRPr lang="en-GB" altLang="zh-CN" dirty="0"/>
+              </a:p>
+              <a:p>
+                <a:r>
+                  <a:rPr lang="en-GB" altLang="zh-CN" dirty="0"/>
+                  <a:t>Fast sampling local minima to account for their formation and transformation.</a:t>
+                </a:r>
+                <a:endParaRPr lang="zh-CN" altLang="en-US" dirty="0"/>
+              </a:p>
+            </p:txBody>
+          </p:sp>
+        </mc:Choice>
+        <mc:Fallback>
+          <p:sp>
+            <p:nvSpPr>
+              <p:cNvPr id="3" name="Content Placeholder 2">
+                <a:extLst>
+                  <a:ext uri="{FF2B5EF4-FFF2-40B4-BE49-F238E27FC236}">
+                    <a16:creationId xmlns:a16="http://schemas.microsoft.com/office/drawing/2014/main" id="{67AF985B-A8B8-9691-73EA-BEB48F227264}"/>
+                  </a:ext>
+                </a:extLst>
+              </p:cNvPr>
+              <p:cNvSpPr>
+                <a:spLocks noGrp="1" noRot="1" noChangeAspect="1" noMove="1" noResize="1" noEditPoints="1" noAdjustHandles="1" noChangeArrowheads="1" noChangeShapeType="1" noTextEdit="1"/>
+              </p:cNvSpPr>
+              <p:nvPr>
+                <p:ph idx="1"/>
+              </p:nvPr>
+            </p:nvSpPr>
+            <p:spPr>
+              <a:xfrm>
+                <a:off x="607464" y="1253330"/>
+                <a:ext cx="10515600" cy="5304487"/>
+              </a:xfrm>
+              <a:blipFill>
+                <a:blip r:embed="rId2"/>
+                <a:stretch>
+                  <a:fillRect l="-1043" t="-1954" b="-2299"/>
+                </a:stretch>
+              </a:blipFill>
+            </p:spPr>
+            <p:txBody>
+              <a:bodyPr/>
+              <a:lstStyle/>
+              <a:p>
+                <a:r>
+                  <a:rPr lang="zh-CN" altLang="en-US">
+                    <a:noFill/>
+                  </a:rPr>
+                  <a:t> </a:t>
+                </a:r>
+              </a:p>
+            </p:txBody>
+          </p:sp>
+        </mc:Fallback>
+      </mc:AlternateContent>
+      <p:pic>
+        <p:nvPicPr>
+          <p:cNvPr id="4" name="Picture 3">
+            <a:extLst>
+              <a:ext uri="{FF2B5EF4-FFF2-40B4-BE49-F238E27FC236}">
+                <a16:creationId xmlns:a16="http://schemas.microsoft.com/office/drawing/2014/main" id="{6D279F7B-0944-F79A-D348-A33F75DA21F3}"/>
+              </a:ext>
+            </a:extLst>
+          </p:cNvPr>
+          <p:cNvPicPr>
+            <a:picLocks noChangeAspect="1"/>
+          </p:cNvPicPr>
+          <p:nvPr/>
+        </p:nvPicPr>
+        <p:blipFill>
+          <a:blip r:embed="rId3"/>
+          <a:stretch>
+            <a:fillRect/>
+          </a:stretch>
+        </p:blipFill>
+        <p:spPr>
+          <a:xfrm>
+            <a:off x="3446346" y="3084512"/>
+            <a:ext cx="3895725" cy="485775"/>
+          </a:xfrm>
+          <a:prstGeom prst="rect">
+            <a:avLst/>
+          </a:prstGeom>
+        </p:spPr>
+      </p:pic>
+    </p:spTree>
+    <p:extLst>
+      <p:ext uri="{BB962C8B-B14F-4D97-AF65-F5344CB8AC3E}">
+        <p14:creationId xmlns:p14="http://schemas.microsoft.com/office/powerpoint/2010/main" val="456839910"/>
       </p:ext>
     </p:extLst>
   </p:cSld>
@@ -6850,6 +7100,10 @@
           </a:bodyPr>
           <a:lstStyle/>
           <a:p>
+            <a:r>
+              <a:rPr lang="en-GB" altLang="zh-CN" dirty="0"/>
+              <a:t>Research goal (2-3 month internship)</a:t>
+            </a:r>
             <a:endParaRPr lang="zh-CN" altLang="en-US" dirty="0"/>
           </a:p>
         </p:txBody>
@@ -6870,12 +7124,33 @@
             <p:ph idx="1"/>
           </p:nvPr>
         </p:nvSpPr>
-        <p:spPr/>
+        <p:spPr>
+          <a:xfrm>
+            <a:off x="607464" y="2249956"/>
+            <a:ext cx="10515600" cy="2358087"/>
+          </a:xfrm>
+        </p:spPr>
         <p:txBody>
           <a:bodyPr/>
           <a:lstStyle/>
           <a:p>
-            <a:endParaRPr lang="zh-CN" altLang="en-US" dirty="0"/>
+            <a:r>
+              <a:rPr lang="en-GB" altLang="zh-CN" b="1" dirty="0"/>
+              <a:t>Clearly define the problem model to sample protein structure.</a:t>
+            </a:r>
+          </a:p>
+          <a:p>
+            <a:r>
+              <a:rPr lang="en-GB" altLang="zh-CN" b="1" dirty="0"/>
+              <a:t>Develop an efficient sampling method for the protein Hamiltonian.</a:t>
+            </a:r>
+          </a:p>
+          <a:p>
+            <a:r>
+              <a:rPr lang="en-GB" altLang="zh-CN" b="1" dirty="0"/>
+              <a:t>Demonstrate the quantum advantage with a small example (e.g. peptide).</a:t>
+            </a:r>
+            <a:endParaRPr lang="zh-CN" altLang="en-US" b="1" dirty="0"/>
           </a:p>
         </p:txBody>
       </p:sp>
@@ -7053,7 +7328,7 @@
         </p:blipFill>
         <p:spPr>
           <a:xfrm>
-            <a:off x="5466991" y="1029390"/>
+            <a:off x="5069827" y="1038626"/>
             <a:ext cx="4496159" cy="1025584"/>
           </a:xfrm>
           <a:prstGeom prst="rect">
@@ -7439,6 +7714,66 @@
           </p:sp>
         </mc:Fallback>
       </mc:AlternateContent>
+      <p:pic>
+        <p:nvPicPr>
+          <p:cNvPr id="8" name="Picture 7">
+            <a:extLst>
+              <a:ext uri="{FF2B5EF4-FFF2-40B4-BE49-F238E27FC236}">
+                <a16:creationId xmlns:a16="http://schemas.microsoft.com/office/drawing/2014/main" id="{8F41EBEC-BA7F-7CD9-549C-759E6D2738A7}"/>
+              </a:ext>
+            </a:extLst>
+          </p:cNvPr>
+          <p:cNvPicPr>
+            <a:picLocks noChangeAspect="1"/>
+          </p:cNvPicPr>
+          <p:nvPr/>
+        </p:nvPicPr>
+        <p:blipFill>
+          <a:blip r:embed="rId5"/>
+          <a:stretch>
+            <a:fillRect/>
+          </a:stretch>
+        </p:blipFill>
+        <p:spPr>
+          <a:xfrm>
+            <a:off x="9565986" y="270604"/>
+            <a:ext cx="2400300" cy="2305351"/>
+          </a:xfrm>
+          <a:prstGeom prst="rect">
+            <a:avLst/>
+          </a:prstGeom>
+        </p:spPr>
+      </p:pic>
+      <p:pic>
+        <p:nvPicPr>
+          <p:cNvPr id="10" name="Picture 9">
+            <a:extLst>
+              <a:ext uri="{FF2B5EF4-FFF2-40B4-BE49-F238E27FC236}">
+                <a16:creationId xmlns:a16="http://schemas.microsoft.com/office/drawing/2014/main" id="{EE82A043-95B2-F73C-AFA1-398604D07A8E}"/>
+              </a:ext>
+            </a:extLst>
+          </p:cNvPr>
+          <p:cNvPicPr>
+            <a:picLocks noChangeAspect="1"/>
+          </p:cNvPicPr>
+          <p:nvPr/>
+        </p:nvPicPr>
+        <p:blipFill>
+          <a:blip r:embed="rId6"/>
+          <a:stretch>
+            <a:fillRect/>
+          </a:stretch>
+        </p:blipFill>
+        <p:spPr>
+          <a:xfrm>
+            <a:off x="9565986" y="2575955"/>
+            <a:ext cx="2400300" cy="957423"/>
+          </a:xfrm>
+          <a:prstGeom prst="rect">
+            <a:avLst/>
+          </a:prstGeom>
+        </p:spPr>
+      </p:pic>
     </p:spTree>
     <p:extLst>
       <p:ext uri="{BB962C8B-B14F-4D97-AF65-F5344CB8AC3E}">
@@ -8028,7 +8363,7 @@
                 <a:pPr lvl="1"/>
                 <a:r>
                   <a:rPr lang="en-US" altLang="zh-CN" dirty="0"/>
-                  <a:t>Irreducible and aperiodic.</a:t>
+                  <a:t>Irreducible and aperiodic condition.</a:t>
                 </a:r>
               </a:p>
               <a:p>
@@ -8113,7 +8448,7 @@
         </p:blipFill>
         <p:spPr>
           <a:xfrm>
-            <a:off x="1986502" y="5467059"/>
+            <a:off x="4221702" y="4820513"/>
             <a:ext cx="2935407" cy="538044"/>
           </a:xfrm>
           <a:prstGeom prst="rect">
@@ -8307,8 +8642,8 @@
           </p:sp>
         </mc:Fallback>
       </mc:AlternateContent>
-      <mc:AlternateContent xmlns:mc="http://schemas.openxmlformats.org/markup-compatibility/2006">
-        <mc:Choice xmlns:a14="http://schemas.microsoft.com/office/drawing/2010/main" Requires="a14">
+      <mc:AlternateContent xmlns:mc="http://schemas.openxmlformats.org/markup-compatibility/2006" xmlns:a14="http://schemas.microsoft.com/office/drawing/2010/main">
+        <mc:Choice Requires="a14">
           <p:sp>
             <p:nvSpPr>
               <p:cNvPr id="3" name="Content Placeholder 2">
@@ -9266,7 +9601,7 @@
             </p:txBody>
           </p:sp>
         </mc:Choice>
-        <mc:Fallback>
+        <mc:Fallback xmlns="">
           <p:sp>
             <p:nvSpPr>
               <p:cNvPr id="3" name="Content Placeholder 2">
@@ -9397,8 +9732,8 @@
           </a:p>
         </p:txBody>
       </p:sp>
-      <mc:AlternateContent xmlns:mc="http://schemas.openxmlformats.org/markup-compatibility/2006">
-        <mc:Choice xmlns:a14="http://schemas.microsoft.com/office/drawing/2010/main" Requires="a14">
+      <mc:AlternateContent xmlns:mc="http://schemas.openxmlformats.org/markup-compatibility/2006" xmlns:a14="http://schemas.microsoft.com/office/drawing/2010/main">
+        <mc:Choice Requires="a14">
           <p:sp>
             <p:nvSpPr>
               <p:cNvPr id="3" name="Content Placeholder 2">
@@ -10214,7 +10549,7 @@
             </p:txBody>
           </p:sp>
         </mc:Choice>
-        <mc:Fallback>
+        <mc:Fallback xmlns="">
           <p:sp>
             <p:nvSpPr>
               <p:cNvPr id="3" name="Content Placeholder 2">
@@ -12312,8 +12647,8 @@
           <a:chExt cx="0" cy="0"/>
         </a:xfrm>
       </p:grpSpPr>
-      <mc:AlternateContent xmlns:mc="http://schemas.openxmlformats.org/markup-compatibility/2006">
-        <mc:Choice xmlns:a14="http://schemas.microsoft.com/office/drawing/2010/main" Requires="a14">
+      <mc:AlternateContent xmlns:mc="http://schemas.openxmlformats.org/markup-compatibility/2006" xmlns:a14="http://schemas.microsoft.com/office/drawing/2010/main">
+        <mc:Choice Requires="a14">
           <p:sp>
             <p:nvSpPr>
               <p:cNvPr id="2" name="Title 1">
@@ -12359,7 +12694,7 @@
             </p:txBody>
           </p:sp>
         </mc:Choice>
-        <mc:Fallback>
+        <mc:Fallback xmlns="">
           <p:sp>
             <p:nvSpPr>
               <p:cNvPr id="2" name="Title 1">

</xml_diff>